<commit_message>
Dodat deo za treci projekat
</commit_message>
<xml_diff>
--- a/Prezentacija projekata/Servisno-orijentisane arhitekture – Projekti.pptx
+++ b/Prezentacija projekata/Servisno-orijentisane arhitekture – Projekti.pptx
@@ -17,7 +17,12 @@
     <p:sldId id="264" r:id="rId11"/>
     <p:sldId id="267" r:id="rId12"/>
     <p:sldId id="268" r:id="rId13"/>
-    <p:sldId id="265" r:id="rId14"/>
+    <p:sldId id="273" r:id="rId14"/>
+    <p:sldId id="269" r:id="rId15"/>
+    <p:sldId id="270" r:id="rId16"/>
+    <p:sldId id="271" r:id="rId17"/>
+    <p:sldId id="272" r:id="rId18"/>
+    <p:sldId id="265" r:id="rId19"/>
   </p:sldIdLst>
   <p:sldSz cx="12192000" cy="6858000"/>
   <p:notesSz cx="6858000" cy="9144000"/>
@@ -313,7 +318,7 @@
             <a:fld id="{B61BEF0D-F0BB-DE4B-95CE-6DB70DBA9567}" type="datetimeFigureOut">
               <a:rPr lang="en-US" smtClean="0"/>
               <a:pPr/>
-              <a:t>8/6/2022</a:t>
+              <a:t>8/10/2022</a:t>
             </a:fld>
             <a:endParaRPr lang="en-US" dirty="0"/>
           </a:p>
@@ -653,7 +658,7 @@
             <a:fld id="{B61BEF0D-F0BB-DE4B-95CE-6DB70DBA9567}" type="datetimeFigureOut">
               <a:rPr lang="en-US" smtClean="0"/>
               <a:pPr/>
-              <a:t>8/6/2022</a:t>
+              <a:t>8/10/2022</a:t>
             </a:fld>
             <a:endParaRPr lang="en-US" dirty="0"/>
           </a:p>
@@ -1056,7 +1061,7 @@
             <a:fld id="{B61BEF0D-F0BB-DE4B-95CE-6DB70DBA9567}" type="datetimeFigureOut">
               <a:rPr lang="en-US" smtClean="0"/>
               <a:pPr/>
-              <a:t>8/6/2022</a:t>
+              <a:t>8/10/2022</a:t>
             </a:fld>
             <a:endParaRPr lang="en-US" dirty="0"/>
           </a:p>
@@ -1394,7 +1399,7 @@
             <a:fld id="{B61BEF0D-F0BB-DE4B-95CE-6DB70DBA9567}" type="datetimeFigureOut">
               <a:rPr lang="en-US" smtClean="0"/>
               <a:pPr/>
-              <a:t>8/6/2022</a:t>
+              <a:t>8/10/2022</a:t>
             </a:fld>
             <a:endParaRPr lang="en-US" dirty="0"/>
           </a:p>
@@ -1716,7 +1721,7 @@
             <a:fld id="{B61BEF0D-F0BB-DE4B-95CE-6DB70DBA9567}" type="datetimeFigureOut">
               <a:rPr lang="en-US" smtClean="0"/>
               <a:pPr/>
-              <a:t>8/6/2022</a:t>
+              <a:t>8/10/2022</a:t>
             </a:fld>
             <a:endParaRPr lang="en-US" dirty="0"/>
           </a:p>
@@ -2114,7 +2119,7 @@
             <a:fld id="{B61BEF0D-F0BB-DE4B-95CE-6DB70DBA9567}" type="datetimeFigureOut">
               <a:rPr lang="en-US" smtClean="0"/>
               <a:pPr/>
-              <a:t>8/6/2022</a:t>
+              <a:t>8/10/2022</a:t>
             </a:fld>
             <a:endParaRPr lang="en-US" dirty="0"/>
           </a:p>
@@ -2373,7 +2378,7 @@
             <a:fld id="{B61BEF0D-F0BB-DE4B-95CE-6DB70DBA9567}" type="datetimeFigureOut">
               <a:rPr lang="en-US" smtClean="0"/>
               <a:pPr/>
-              <a:t>8/6/2022</a:t>
+              <a:t>8/10/2022</a:t>
             </a:fld>
             <a:endParaRPr lang="en-US" dirty="0"/>
           </a:p>
@@ -2637,7 +2642,7 @@
             <a:fld id="{B61BEF0D-F0BB-DE4B-95CE-6DB70DBA9567}" type="datetimeFigureOut">
               <a:rPr lang="en-US" smtClean="0"/>
               <a:pPr/>
-              <a:t>8/6/2022</a:t>
+              <a:t>8/10/2022</a:t>
             </a:fld>
             <a:endParaRPr lang="en-US" dirty="0"/>
           </a:p>
@@ -2901,7 +2906,7 @@
             <a:fld id="{B61BEF0D-F0BB-DE4B-95CE-6DB70DBA9567}" type="datetimeFigureOut">
               <a:rPr lang="en-US" smtClean="0"/>
               <a:pPr/>
-              <a:t>8/6/2022</a:t>
+              <a:t>8/10/2022</a:t>
             </a:fld>
             <a:endParaRPr lang="en-US" dirty="0"/>
           </a:p>
@@ -3232,7 +3237,7 @@
             <a:fld id="{B61BEF0D-F0BB-DE4B-95CE-6DB70DBA9567}" type="datetimeFigureOut">
               <a:rPr lang="en-US" smtClean="0"/>
               <a:pPr/>
-              <a:t>8/6/2022</a:t>
+              <a:t>8/10/2022</a:t>
             </a:fld>
             <a:endParaRPr lang="en-US" dirty="0"/>
           </a:p>
@@ -3557,7 +3562,7 @@
             <a:fld id="{B61BEF0D-F0BB-DE4B-95CE-6DB70DBA9567}" type="datetimeFigureOut">
               <a:rPr lang="en-US" smtClean="0"/>
               <a:pPr/>
-              <a:t>8/6/2022</a:t>
+              <a:t>8/10/2022</a:t>
             </a:fld>
             <a:endParaRPr lang="en-US" dirty="0"/>
           </a:p>
@@ -4016,7 +4021,7 @@
             <a:fld id="{B61BEF0D-F0BB-DE4B-95CE-6DB70DBA9567}" type="datetimeFigureOut">
               <a:rPr lang="en-US" smtClean="0"/>
               <a:pPr/>
-              <a:t>8/6/2022</a:t>
+              <a:t>8/10/2022</a:t>
             </a:fld>
             <a:endParaRPr lang="en-US" dirty="0"/>
           </a:p>
@@ -4223,7 +4228,7 @@
             <a:fld id="{B61BEF0D-F0BB-DE4B-95CE-6DB70DBA9567}" type="datetimeFigureOut">
               <a:rPr lang="en-US" smtClean="0"/>
               <a:pPr/>
-              <a:t>8/6/2022</a:t>
+              <a:t>8/10/2022</a:t>
             </a:fld>
             <a:endParaRPr lang="en-US" dirty="0"/>
           </a:p>
@@ -4402,7 +4407,7 @@
             <a:fld id="{B61BEF0D-F0BB-DE4B-95CE-6DB70DBA9567}" type="datetimeFigureOut">
               <a:rPr lang="en-US" smtClean="0"/>
               <a:pPr/>
-              <a:t>8/6/2022</a:t>
+              <a:t>8/10/2022</a:t>
             </a:fld>
             <a:endParaRPr lang="en-US" dirty="0"/>
           </a:p>
@@ -4737,7 +4742,7 @@
             <a:fld id="{B61BEF0D-F0BB-DE4B-95CE-6DB70DBA9567}" type="datetimeFigureOut">
               <a:rPr lang="en-US" smtClean="0"/>
               <a:pPr/>
-              <a:t>8/6/2022</a:t>
+              <a:t>8/10/2022</a:t>
             </a:fld>
             <a:endParaRPr lang="en-US" dirty="0"/>
           </a:p>
@@ -5084,7 +5089,7 @@
             <a:fld id="{B61BEF0D-F0BB-DE4B-95CE-6DB70DBA9567}" type="datetimeFigureOut">
               <a:rPr lang="en-US" smtClean="0"/>
               <a:pPr/>
-              <a:t>8/6/2022</a:t>
+              <a:t>8/10/2022</a:t>
             </a:fld>
             <a:endParaRPr lang="en-US" dirty="0"/>
           </a:p>
@@ -7203,7 +7208,7 @@
             <a:fld id="{B61BEF0D-F0BB-DE4B-95CE-6DB70DBA9567}" type="datetimeFigureOut">
               <a:rPr lang="en-US" smtClean="0"/>
               <a:pPr/>
-              <a:t>8/6/2022</a:t>
+              <a:t>8/10/2022</a:t>
             </a:fld>
             <a:endParaRPr lang="en-US" dirty="0"/>
           </a:p>
@@ -8697,6 +8702,1027 @@
           <p:cNvPr id="2" name="Title 1">
             <a:extLst>
               <a:ext uri="{FF2B5EF4-FFF2-40B4-BE49-F238E27FC236}">
+                <a16:creationId xmlns:a16="http://schemas.microsoft.com/office/drawing/2014/main" id="{29BCC590-9C8A-4304-87FB-F542A3B8182B}"/>
+              </a:ext>
+            </a:extLst>
+          </p:cNvPr>
+          <p:cNvSpPr>
+            <a:spLocks noGrp="1"/>
+          </p:cNvSpPr>
+          <p:nvPr>
+            <p:ph type="title"/>
+          </p:nvPr>
+        </p:nvSpPr>
+        <p:spPr/>
+        <p:txBody>
+          <a:bodyPr/>
+          <a:lstStyle/>
+          <a:p>
+            <a:r>
+              <a:rPr lang="en-US" dirty="0" err="1"/>
+              <a:t>Projekat</a:t>
+            </a:r>
+            <a:r>
+              <a:rPr lang="en-US" dirty="0"/>
+              <a:t> 2 - </a:t>
+            </a:r>
+            <a:r>
+              <a:rPr lang="en-US" dirty="0" err="1"/>
+              <a:t>gRPC</a:t>
+            </a:r>
+            <a:endParaRPr lang="en-US" dirty="0"/>
+          </a:p>
+        </p:txBody>
+      </p:sp>
+      <p:sp>
+        <p:nvSpPr>
+          <p:cNvPr id="3" name="Content Placeholder 2">
+            <a:extLst>
+              <a:ext uri="{FF2B5EF4-FFF2-40B4-BE49-F238E27FC236}">
+                <a16:creationId xmlns:a16="http://schemas.microsoft.com/office/drawing/2014/main" id="{968D5202-A122-4BD5-871D-5692CE23E17B}"/>
+              </a:ext>
+            </a:extLst>
+          </p:cNvPr>
+          <p:cNvSpPr>
+            <a:spLocks noGrp="1"/>
+          </p:cNvSpPr>
+          <p:nvPr>
+            <p:ph idx="1"/>
+          </p:nvPr>
+        </p:nvSpPr>
+        <p:spPr/>
+        <p:txBody>
+          <a:bodyPr/>
+          <a:lstStyle/>
+          <a:p>
+            <a:r>
+              <a:rPr lang="en-US" dirty="0" err="1"/>
+              <a:t>Slika</a:t>
+            </a:r>
+            <a:r>
+              <a:rPr lang="en-US" dirty="0"/>
+              <a:t> za </a:t>
+            </a:r>
+            <a:r>
+              <a:rPr lang="en-US" dirty="0" err="1"/>
+              <a:t>gRPC</a:t>
+            </a:r>
+            <a:endParaRPr lang="en-US" dirty="0"/>
+          </a:p>
+        </p:txBody>
+      </p:sp>
+    </p:spTree>
+    <p:extLst>
+      <p:ext uri="{BB962C8B-B14F-4D97-AF65-F5344CB8AC3E}">
+        <p14:creationId xmlns:p14="http://schemas.microsoft.com/office/powerpoint/2010/main" val="132094046"/>
+      </p:ext>
+    </p:extLst>
+  </p:cSld>
+  <p:clrMapOvr>
+    <a:masterClrMapping/>
+  </p:clrMapOvr>
+</p:sld>
+</file>
+
+<file path=ppt/slides/slide14.xml><?xml version="1.0" encoding="utf-8"?>
+<p:sld xmlns:a="http://schemas.openxmlformats.org/drawingml/2006/main" xmlns:r="http://schemas.openxmlformats.org/officeDocument/2006/relationships" xmlns:p="http://schemas.openxmlformats.org/presentationml/2006/main">
+  <p:cSld>
+    <p:spTree>
+      <p:nvGrpSpPr>
+        <p:cNvPr id="1" name=""/>
+        <p:cNvGrpSpPr/>
+        <p:nvPr/>
+      </p:nvGrpSpPr>
+      <p:grpSpPr>
+        <a:xfrm>
+          <a:off x="0" y="0"/>
+          <a:ext cx="0" cy="0"/>
+          <a:chOff x="0" y="0"/>
+          <a:chExt cx="0" cy="0"/>
+        </a:xfrm>
+      </p:grpSpPr>
+      <p:sp>
+        <p:nvSpPr>
+          <p:cNvPr id="2" name="Title 1">
+            <a:extLst>
+              <a:ext uri="{FF2B5EF4-FFF2-40B4-BE49-F238E27FC236}">
+                <a16:creationId xmlns:a16="http://schemas.microsoft.com/office/drawing/2014/main" id="{1D7DA1C0-44F9-4A09-900A-F65B66D8E557}"/>
+              </a:ext>
+            </a:extLst>
+          </p:cNvPr>
+          <p:cNvSpPr>
+            <a:spLocks noGrp="1"/>
+          </p:cNvSpPr>
+          <p:nvPr>
+            <p:ph type="title"/>
+          </p:nvPr>
+        </p:nvSpPr>
+        <p:spPr/>
+        <p:txBody>
+          <a:bodyPr/>
+          <a:lstStyle/>
+          <a:p>
+            <a:r>
+              <a:rPr lang="en-US" dirty="0" err="1"/>
+              <a:t>Projekat</a:t>
+            </a:r>
+            <a:r>
+              <a:rPr lang="en-US" dirty="0"/>
+              <a:t> 3 – </a:t>
+            </a:r>
+            <a:r>
+              <a:rPr lang="en-US" dirty="0" err="1"/>
+              <a:t>Ideja</a:t>
+            </a:r>
+            <a:r>
+              <a:rPr lang="en-US" dirty="0"/>
+              <a:t> </a:t>
+            </a:r>
+          </a:p>
+        </p:txBody>
+      </p:sp>
+      <p:sp>
+        <p:nvSpPr>
+          <p:cNvPr id="3" name="Content Placeholder 2">
+            <a:extLst>
+              <a:ext uri="{FF2B5EF4-FFF2-40B4-BE49-F238E27FC236}">
+                <a16:creationId xmlns:a16="http://schemas.microsoft.com/office/drawing/2014/main" id="{B416BF1D-807B-477A-9A07-2D0462FB481D}"/>
+              </a:ext>
+            </a:extLst>
+          </p:cNvPr>
+          <p:cNvSpPr>
+            <a:spLocks noGrp="1"/>
+          </p:cNvSpPr>
+          <p:nvPr>
+            <p:ph idx="1"/>
+          </p:nvPr>
+        </p:nvSpPr>
+        <p:spPr/>
+        <p:txBody>
+          <a:bodyPr/>
+          <a:lstStyle/>
+          <a:p>
+            <a:r>
+              <a:rPr lang="en-US" dirty="0" err="1"/>
+              <a:t>Ideja</a:t>
+            </a:r>
+            <a:r>
+              <a:rPr lang="en-US" dirty="0"/>
+              <a:t> treceg </a:t>
+            </a:r>
+            <a:r>
+              <a:rPr lang="en-US" dirty="0" err="1"/>
+              <a:t>projekta</a:t>
+            </a:r>
+            <a:r>
+              <a:rPr lang="en-US" dirty="0"/>
+              <a:t> je </a:t>
+            </a:r>
+            <a:r>
+              <a:rPr lang="en-US" dirty="0" err="1"/>
+              <a:t>slicna</a:t>
+            </a:r>
+            <a:r>
+              <a:rPr lang="en-US" dirty="0"/>
+              <a:t> </a:t>
+            </a:r>
+            <a:r>
+              <a:rPr lang="en-US" dirty="0" err="1"/>
+              <a:t>ideji</a:t>
+            </a:r>
+            <a:r>
+              <a:rPr lang="en-US" dirty="0"/>
+              <a:t> </a:t>
+            </a:r>
+            <a:r>
+              <a:rPr lang="en-US" dirty="0" err="1"/>
+              <a:t>drugog</a:t>
+            </a:r>
+            <a:r>
+              <a:rPr lang="en-US" dirty="0"/>
+              <a:t> </a:t>
+            </a:r>
+            <a:r>
+              <a:rPr lang="en-US" dirty="0" err="1"/>
+              <a:t>projekta</a:t>
+            </a:r>
+            <a:r>
+              <a:rPr lang="en-US" dirty="0"/>
+              <a:t> </a:t>
+            </a:r>
+            <a:r>
+              <a:rPr lang="en-US" dirty="0" err="1"/>
+              <a:t>pri</a:t>
+            </a:r>
+            <a:r>
+              <a:rPr lang="en-US" dirty="0"/>
+              <a:t> </a:t>
+            </a:r>
+            <a:r>
+              <a:rPr lang="en-US" dirty="0" err="1"/>
+              <a:t>cemu</a:t>
+            </a:r>
+            <a:r>
+              <a:rPr lang="en-US" dirty="0"/>
+              <a:t> se </a:t>
+            </a:r>
+            <a:r>
+              <a:rPr lang="en-US" dirty="0" err="1"/>
+              <a:t>radi</a:t>
+            </a:r>
+            <a:r>
+              <a:rPr lang="en-US" dirty="0"/>
+              <a:t> </a:t>
+            </a:r>
+            <a:r>
+              <a:rPr lang="en-US" dirty="0" err="1"/>
+              <a:t>sa</a:t>
+            </a:r>
+            <a:r>
+              <a:rPr lang="en-US" dirty="0"/>
+              <a:t> </a:t>
+            </a:r>
+            <a:r>
+              <a:rPr lang="en-US" dirty="0" err="1"/>
+              <a:t>drugim</a:t>
+            </a:r>
+            <a:r>
+              <a:rPr lang="en-US" dirty="0"/>
+              <a:t> </a:t>
+            </a:r>
+            <a:r>
+              <a:rPr lang="en-US" dirty="0" err="1"/>
+              <a:t>datasetom</a:t>
+            </a:r>
+            <a:r>
+              <a:rPr lang="en-US" dirty="0"/>
+              <a:t> </a:t>
+            </a:r>
+            <a:r>
+              <a:rPr lang="en-US" dirty="0" err="1"/>
+              <a:t>takodje</a:t>
+            </a:r>
+            <a:r>
+              <a:rPr lang="en-US" dirty="0"/>
+              <a:t> </a:t>
+            </a:r>
+            <a:r>
+              <a:rPr lang="en-US" dirty="0" err="1"/>
+              <a:t>sa</a:t>
+            </a:r>
+            <a:r>
+              <a:rPr lang="en-US" dirty="0"/>
+              <a:t> </a:t>
+            </a:r>
+            <a:r>
+              <a:rPr lang="en-US" dirty="0" err="1"/>
+              <a:t>podacima</a:t>
+            </a:r>
+            <a:r>
+              <a:rPr lang="en-US" dirty="0"/>
+              <a:t> o </a:t>
+            </a:r>
+            <a:r>
+              <a:rPr lang="en-US" dirty="0" err="1"/>
+              <a:t>kvalitetu</a:t>
+            </a:r>
+            <a:r>
+              <a:rPr lang="en-US" dirty="0"/>
+              <a:t> </a:t>
+            </a:r>
+            <a:r>
+              <a:rPr lang="en-US" dirty="0" err="1"/>
+              <a:t>zemljista</a:t>
+            </a:r>
+            <a:r>
+              <a:rPr lang="en-US" dirty="0"/>
+              <a:t>. </a:t>
+            </a:r>
+            <a:r>
+              <a:rPr lang="en-US" dirty="0" err="1"/>
+              <a:t>Razlika</a:t>
+            </a:r>
+            <a:r>
+              <a:rPr lang="en-US" dirty="0"/>
+              <a:t> </a:t>
+            </a:r>
+            <a:r>
+              <a:rPr lang="en-US" dirty="0" err="1"/>
+              <a:t>postoji</a:t>
+            </a:r>
+            <a:r>
+              <a:rPr lang="en-US" dirty="0"/>
+              <a:t> u tome da </a:t>
+            </a:r>
+            <a:r>
+              <a:rPr lang="en-US" dirty="0" err="1"/>
+              <a:t>kada</a:t>
+            </a:r>
+            <a:r>
+              <a:rPr lang="en-US" dirty="0"/>
+              <a:t> se </a:t>
+            </a:r>
+            <a:r>
+              <a:rPr lang="en-US" dirty="0" err="1"/>
+              <a:t>detektuje</a:t>
+            </a:r>
+            <a:r>
+              <a:rPr lang="en-US" dirty="0"/>
+              <a:t> </a:t>
+            </a:r>
+            <a:r>
+              <a:rPr lang="en-US" dirty="0" err="1"/>
+              <a:t>odredjeni</a:t>
+            </a:r>
+            <a:r>
+              <a:rPr lang="en-US" dirty="0"/>
+              <a:t> </a:t>
+            </a:r>
+            <a:r>
+              <a:rPr lang="en-US" dirty="0" err="1"/>
+              <a:t>nivo</a:t>
+            </a:r>
+            <a:r>
+              <a:rPr lang="en-US" dirty="0"/>
+              <a:t> </a:t>
+            </a:r>
+            <a:r>
+              <a:rPr lang="en-US" dirty="0" err="1"/>
+              <a:t>vlaznosti</a:t>
+            </a:r>
+            <a:r>
+              <a:rPr lang="en-US" dirty="0"/>
+              <a:t> </a:t>
+            </a:r>
+            <a:r>
+              <a:rPr lang="en-US" dirty="0" err="1"/>
+              <a:t>zemljista</a:t>
+            </a:r>
+            <a:r>
+              <a:rPr lang="en-US" dirty="0"/>
+              <a:t> se ne </a:t>
+            </a:r>
+            <a:r>
+              <a:rPr lang="en-US" dirty="0" err="1"/>
+              <a:t>obavestava</a:t>
+            </a:r>
+            <a:r>
+              <a:rPr lang="en-US" dirty="0"/>
+              <a:t> </a:t>
+            </a:r>
+            <a:r>
+              <a:rPr lang="en-US" dirty="0" err="1"/>
+              <a:t>klijent</a:t>
+            </a:r>
+            <a:r>
+              <a:rPr lang="en-US" dirty="0"/>
+              <a:t> vec se </a:t>
+            </a:r>
+            <a:r>
+              <a:rPr lang="en-US" dirty="0" err="1"/>
+              <a:t>pali</a:t>
+            </a:r>
+            <a:r>
+              <a:rPr lang="en-US" dirty="0"/>
+              <a:t> </a:t>
+            </a:r>
+            <a:r>
+              <a:rPr lang="en-US" dirty="0" err="1"/>
+              <a:t>i</a:t>
+            </a:r>
+            <a:r>
+              <a:rPr lang="en-US" dirty="0"/>
+              <a:t> </a:t>
+            </a:r>
+            <a:r>
+              <a:rPr lang="en-US" dirty="0" err="1"/>
+              <a:t>gasi</a:t>
+            </a:r>
+            <a:r>
+              <a:rPr lang="en-US" dirty="0"/>
+              <a:t> </a:t>
+            </a:r>
+            <a:r>
+              <a:rPr lang="en-US" dirty="0" err="1"/>
+              <a:t>pumpa</a:t>
+            </a:r>
+            <a:r>
+              <a:rPr lang="en-US" dirty="0"/>
+              <a:t> za </a:t>
+            </a:r>
+            <a:r>
+              <a:rPr lang="en-US" dirty="0" err="1"/>
+              <a:t>vodu</a:t>
+            </a:r>
+            <a:r>
+              <a:rPr lang="en-US" dirty="0"/>
+              <a:t> </a:t>
+            </a:r>
+            <a:r>
+              <a:rPr lang="en-US" dirty="0" err="1"/>
+              <a:t>koja</a:t>
+            </a:r>
+            <a:r>
+              <a:rPr lang="en-US" dirty="0"/>
+              <a:t> </a:t>
+            </a:r>
+            <a:r>
+              <a:rPr lang="en-US" dirty="0" err="1"/>
+              <a:t>regulise</a:t>
+            </a:r>
+            <a:r>
+              <a:rPr lang="en-US" dirty="0"/>
+              <a:t> </a:t>
+            </a:r>
+            <a:r>
+              <a:rPr lang="en-US" dirty="0" err="1"/>
+              <a:t>vlaznost</a:t>
+            </a:r>
+            <a:r>
+              <a:rPr lang="en-US" dirty="0"/>
+              <a:t> </a:t>
+            </a:r>
+            <a:r>
+              <a:rPr lang="en-US" dirty="0" err="1"/>
+              <a:t>zemljista</a:t>
+            </a:r>
+            <a:r>
+              <a:rPr lang="en-US" dirty="0"/>
+              <a:t>. </a:t>
+            </a:r>
+          </a:p>
+          <a:p>
+            <a:r>
+              <a:rPr lang="en-US" dirty="0" err="1"/>
+              <a:t>Svi</a:t>
+            </a:r>
+            <a:r>
+              <a:rPr lang="en-US" dirty="0"/>
+              <a:t> </a:t>
+            </a:r>
+            <a:r>
+              <a:rPr lang="en-US" dirty="0" err="1"/>
+              <a:t>podaci</a:t>
+            </a:r>
+            <a:r>
+              <a:rPr lang="en-US" dirty="0"/>
+              <a:t> </a:t>
+            </a:r>
+            <a:r>
+              <a:rPr lang="en-US" dirty="0" err="1"/>
+              <a:t>koje</a:t>
+            </a:r>
+            <a:r>
+              <a:rPr lang="en-US" dirty="0"/>
+              <a:t> </a:t>
+            </a:r>
+            <a:r>
+              <a:rPr lang="en-US" dirty="0" err="1"/>
+              <a:t>generise</a:t>
+            </a:r>
+            <a:r>
+              <a:rPr lang="en-US" dirty="0"/>
+              <a:t> sensor se </a:t>
+            </a:r>
+            <a:r>
+              <a:rPr lang="en-US" dirty="0" err="1"/>
+              <a:t>pamte</a:t>
+            </a:r>
+            <a:r>
+              <a:rPr lang="en-US" dirty="0"/>
+              <a:t> u Time </a:t>
+            </a:r>
+            <a:r>
+              <a:rPr lang="en-US" dirty="0" err="1"/>
+              <a:t>Serius</a:t>
+            </a:r>
+            <a:r>
+              <a:rPr lang="en-US" dirty="0"/>
+              <a:t> </a:t>
+            </a:r>
+            <a:r>
+              <a:rPr lang="en-US" dirty="0" err="1"/>
+              <a:t>bazu</a:t>
+            </a:r>
+            <a:r>
+              <a:rPr lang="en-US" dirty="0"/>
+              <a:t> </a:t>
+            </a:r>
+            <a:r>
+              <a:rPr lang="en-US" dirty="0" err="1"/>
+              <a:t>podataka</a:t>
+            </a:r>
+            <a:r>
+              <a:rPr lang="en-US" dirty="0"/>
+              <a:t> </a:t>
+            </a:r>
+            <a:r>
+              <a:rPr lang="en-US" dirty="0" err="1"/>
+              <a:t>i</a:t>
+            </a:r>
+            <a:r>
+              <a:rPr lang="en-US" dirty="0"/>
+              <a:t> </a:t>
+            </a:r>
+            <a:r>
+              <a:rPr lang="en-US" dirty="0" err="1"/>
+              <a:t>moguc</a:t>
+            </a:r>
+            <a:r>
+              <a:rPr lang="en-US" dirty="0"/>
+              <a:t> je </a:t>
+            </a:r>
+            <a:r>
+              <a:rPr lang="en-US" dirty="0" err="1"/>
+              <a:t>graficki</a:t>
+            </a:r>
+            <a:r>
+              <a:rPr lang="en-US" dirty="0"/>
+              <a:t> </a:t>
+            </a:r>
+            <a:r>
+              <a:rPr lang="en-US" dirty="0" err="1"/>
+              <a:t>prikaz</a:t>
+            </a:r>
+            <a:r>
+              <a:rPr lang="en-US" dirty="0"/>
+              <a:t> </a:t>
+            </a:r>
+            <a:r>
+              <a:rPr lang="en-US" dirty="0" err="1"/>
+              <a:t>tih</a:t>
+            </a:r>
+            <a:r>
+              <a:rPr lang="en-US" dirty="0"/>
+              <a:t> </a:t>
+            </a:r>
+            <a:r>
+              <a:rPr lang="en-US" dirty="0" err="1"/>
+              <a:t>podatka</a:t>
+            </a:r>
+            <a:r>
+              <a:rPr lang="en-US" dirty="0"/>
+              <a:t>.</a:t>
+            </a:r>
+          </a:p>
+          <a:p>
+            <a:r>
+              <a:rPr lang="en-US" dirty="0" err="1"/>
+              <a:t>Simulaciju</a:t>
+            </a:r>
+            <a:r>
+              <a:rPr lang="en-US" dirty="0"/>
+              <a:t> </a:t>
+            </a:r>
+            <a:r>
+              <a:rPr lang="en-US" dirty="0" err="1"/>
+              <a:t>rada</a:t>
+            </a:r>
+            <a:r>
+              <a:rPr lang="en-US" dirty="0"/>
+              <a:t> </a:t>
+            </a:r>
+            <a:r>
+              <a:rPr lang="en-US" dirty="0" err="1"/>
+              <a:t>senzora</a:t>
+            </a:r>
+            <a:r>
+              <a:rPr lang="en-US" dirty="0"/>
+              <a:t> </a:t>
+            </a:r>
+            <a:r>
+              <a:rPr lang="en-US" dirty="0" err="1"/>
+              <a:t>zamenjuje</a:t>
+            </a:r>
+            <a:r>
+              <a:rPr lang="en-US" dirty="0"/>
+              <a:t> </a:t>
+            </a:r>
+            <a:r>
+              <a:rPr lang="en-US" dirty="0" err="1"/>
+              <a:t>konzolna</a:t>
+            </a:r>
+            <a:r>
+              <a:rPr lang="en-US" dirty="0"/>
+              <a:t> </a:t>
+            </a:r>
+            <a:r>
+              <a:rPr lang="en-US" dirty="0" err="1"/>
+              <a:t>aplikacija</a:t>
+            </a:r>
+            <a:r>
+              <a:rPr lang="en-US" dirty="0"/>
+              <a:t> </a:t>
+            </a:r>
+            <a:r>
+              <a:rPr lang="en-US" dirty="0" err="1"/>
+              <a:t>koja</a:t>
+            </a:r>
+            <a:r>
+              <a:rPr lang="en-US" dirty="0"/>
+              <a:t> </a:t>
+            </a:r>
+            <a:r>
+              <a:rPr lang="en-US" dirty="0" err="1"/>
+              <a:t>ucitava</a:t>
+            </a:r>
+            <a:r>
+              <a:rPr lang="en-US" dirty="0"/>
+              <a:t> </a:t>
+            </a:r>
+            <a:r>
+              <a:rPr lang="en-US" dirty="0" err="1"/>
+              <a:t>podatke</a:t>
+            </a:r>
+            <a:r>
+              <a:rPr lang="en-US" dirty="0"/>
+              <a:t> </a:t>
+            </a:r>
+            <a:r>
+              <a:rPr lang="en-US" dirty="0" err="1"/>
+              <a:t>iz</a:t>
+            </a:r>
+            <a:r>
+              <a:rPr lang="en-US" dirty="0"/>
+              <a:t> .csv dataset-a. </a:t>
+            </a:r>
+          </a:p>
+        </p:txBody>
+      </p:sp>
+    </p:spTree>
+    <p:extLst>
+      <p:ext uri="{BB962C8B-B14F-4D97-AF65-F5344CB8AC3E}">
+        <p14:creationId xmlns:p14="http://schemas.microsoft.com/office/powerpoint/2010/main" val="1727055962"/>
+      </p:ext>
+    </p:extLst>
+  </p:cSld>
+  <p:clrMapOvr>
+    <a:masterClrMapping/>
+  </p:clrMapOvr>
+</p:sld>
+</file>
+
+<file path=ppt/slides/slide15.xml><?xml version="1.0" encoding="utf-8"?>
+<p:sld xmlns:a="http://schemas.openxmlformats.org/drawingml/2006/main" xmlns:r="http://schemas.openxmlformats.org/officeDocument/2006/relationships" xmlns:p="http://schemas.openxmlformats.org/presentationml/2006/main">
+  <p:cSld>
+    <p:spTree>
+      <p:nvGrpSpPr>
+        <p:cNvPr id="1" name=""/>
+        <p:cNvGrpSpPr/>
+        <p:nvPr/>
+      </p:nvGrpSpPr>
+      <p:grpSpPr>
+        <a:xfrm>
+          <a:off x="0" y="0"/>
+          <a:ext cx="0" cy="0"/>
+          <a:chOff x="0" y="0"/>
+          <a:chExt cx="0" cy="0"/>
+        </a:xfrm>
+      </p:grpSpPr>
+      <p:sp>
+        <p:nvSpPr>
+          <p:cNvPr id="2" name="Title 1">
+            <a:extLst>
+              <a:ext uri="{FF2B5EF4-FFF2-40B4-BE49-F238E27FC236}">
+                <a16:creationId xmlns:a16="http://schemas.microsoft.com/office/drawing/2014/main" id="{9F3A1123-7E28-4367-B50E-37E3CD5FDA7F}"/>
+              </a:ext>
+            </a:extLst>
+          </p:cNvPr>
+          <p:cNvSpPr>
+            <a:spLocks noGrp="1"/>
+          </p:cNvSpPr>
+          <p:nvPr>
+            <p:ph type="title"/>
+          </p:nvPr>
+        </p:nvSpPr>
+        <p:spPr/>
+        <p:txBody>
+          <a:bodyPr/>
+          <a:lstStyle/>
+          <a:p>
+            <a:pPr algn="ctr"/>
+            <a:r>
+              <a:rPr lang="en-US" dirty="0" err="1"/>
+              <a:t>Projekat</a:t>
+            </a:r>
+            <a:r>
+              <a:rPr lang="en-US" dirty="0"/>
+              <a:t> 3 – </a:t>
+            </a:r>
+            <a:r>
+              <a:rPr lang="en-US" dirty="0" err="1"/>
+              <a:t>Arhitektura</a:t>
+            </a:r>
+            <a:r>
+              <a:rPr lang="en-US" dirty="0"/>
+              <a:t> </a:t>
+            </a:r>
+          </a:p>
+        </p:txBody>
+      </p:sp>
+      <p:pic>
+        <p:nvPicPr>
+          <p:cNvPr id="5" name="Content Placeholder 4">
+            <a:extLst>
+              <a:ext uri="{FF2B5EF4-FFF2-40B4-BE49-F238E27FC236}">
+                <a16:creationId xmlns:a16="http://schemas.microsoft.com/office/drawing/2014/main" id="{80315FCF-FC51-44CE-81D8-44FF65EE1EDE}"/>
+              </a:ext>
+            </a:extLst>
+          </p:cNvPr>
+          <p:cNvPicPr>
+            <a:picLocks noGrp="1" noChangeAspect="1"/>
+          </p:cNvPicPr>
+          <p:nvPr>
+            <p:ph idx="1"/>
+          </p:nvPr>
+        </p:nvPicPr>
+        <p:blipFill>
+          <a:blip r:embed="rId2"/>
+          <a:stretch>
+            <a:fillRect/>
+          </a:stretch>
+        </p:blipFill>
+        <p:spPr>
+          <a:xfrm>
+            <a:off x="2592925" y="1495167"/>
+            <a:ext cx="8562403" cy="4552607"/>
+          </a:xfrm>
+        </p:spPr>
+      </p:pic>
+    </p:spTree>
+    <p:extLst>
+      <p:ext uri="{BB962C8B-B14F-4D97-AF65-F5344CB8AC3E}">
+        <p14:creationId xmlns:p14="http://schemas.microsoft.com/office/powerpoint/2010/main" val="4168635874"/>
+      </p:ext>
+    </p:extLst>
+  </p:cSld>
+  <p:clrMapOvr>
+    <a:masterClrMapping/>
+  </p:clrMapOvr>
+</p:sld>
+</file>
+
+<file path=ppt/slides/slide16.xml><?xml version="1.0" encoding="utf-8"?>
+<p:sld xmlns:a="http://schemas.openxmlformats.org/drawingml/2006/main" xmlns:r="http://schemas.openxmlformats.org/officeDocument/2006/relationships" xmlns:p="http://schemas.openxmlformats.org/presentationml/2006/main">
+  <p:cSld>
+    <p:spTree>
+      <p:nvGrpSpPr>
+        <p:cNvPr id="1" name=""/>
+        <p:cNvGrpSpPr/>
+        <p:nvPr/>
+      </p:nvGrpSpPr>
+      <p:grpSpPr>
+        <a:xfrm>
+          <a:off x="0" y="0"/>
+          <a:ext cx="0" cy="0"/>
+          <a:chOff x="0" y="0"/>
+          <a:chExt cx="0" cy="0"/>
+        </a:xfrm>
+      </p:grpSpPr>
+      <p:sp>
+        <p:nvSpPr>
+          <p:cNvPr id="2" name="Title 1">
+            <a:extLst>
+              <a:ext uri="{FF2B5EF4-FFF2-40B4-BE49-F238E27FC236}">
+                <a16:creationId xmlns:a16="http://schemas.microsoft.com/office/drawing/2014/main" id="{B7304245-EA76-4FC2-A656-3834522E9F1C}"/>
+              </a:ext>
+            </a:extLst>
+          </p:cNvPr>
+          <p:cNvSpPr>
+            <a:spLocks noGrp="1"/>
+          </p:cNvSpPr>
+          <p:nvPr>
+            <p:ph type="title"/>
+          </p:nvPr>
+        </p:nvSpPr>
+        <p:spPr>
+          <a:xfrm>
+            <a:off x="1640156" y="191521"/>
+            <a:ext cx="8911687" cy="1280890"/>
+          </a:xfrm>
+        </p:spPr>
+        <p:txBody>
+          <a:bodyPr/>
+          <a:lstStyle/>
+          <a:p>
+            <a:pPr algn="ctr"/>
+            <a:r>
+              <a:rPr lang="en-US" dirty="0" err="1"/>
+              <a:t>Projekat</a:t>
+            </a:r>
+            <a:r>
+              <a:rPr lang="en-US" dirty="0"/>
+              <a:t> 3 – </a:t>
+            </a:r>
+            <a:r>
+              <a:rPr lang="en-US" dirty="0" err="1"/>
+              <a:t>Senzor</a:t>
+            </a:r>
+            <a:r>
+              <a:rPr lang="en-US" dirty="0"/>
+              <a:t> &amp; </a:t>
+            </a:r>
+            <a:r>
+              <a:rPr lang="en-US" dirty="0" err="1"/>
+              <a:t>Aktuator</a:t>
+            </a:r>
+            <a:endParaRPr lang="en-US" dirty="0"/>
+          </a:p>
+        </p:txBody>
+      </p:sp>
+      <p:pic>
+        <p:nvPicPr>
+          <p:cNvPr id="7" name="Picture 6">
+            <a:extLst>
+              <a:ext uri="{FF2B5EF4-FFF2-40B4-BE49-F238E27FC236}">
+                <a16:creationId xmlns:a16="http://schemas.microsoft.com/office/drawing/2014/main" id="{3CC8A8C6-688E-4616-94AA-3C6E48FF52E5}"/>
+              </a:ext>
+            </a:extLst>
+          </p:cNvPr>
+          <p:cNvPicPr>
+            <a:picLocks noChangeAspect="1"/>
+          </p:cNvPicPr>
+          <p:nvPr/>
+        </p:nvPicPr>
+        <p:blipFill>
+          <a:blip r:embed="rId2"/>
+          <a:stretch>
+            <a:fillRect/>
+          </a:stretch>
+        </p:blipFill>
+        <p:spPr>
+          <a:xfrm>
+            <a:off x="1123255" y="732570"/>
+            <a:ext cx="9945488" cy="6125430"/>
+          </a:xfrm>
+          <a:prstGeom prst="rect">
+            <a:avLst/>
+          </a:prstGeom>
+        </p:spPr>
+      </p:pic>
+      <p:pic>
+        <p:nvPicPr>
+          <p:cNvPr id="5" name="Content Placeholder 4">
+            <a:extLst>
+              <a:ext uri="{FF2B5EF4-FFF2-40B4-BE49-F238E27FC236}">
+                <a16:creationId xmlns:a16="http://schemas.microsoft.com/office/drawing/2014/main" id="{0D73CBBE-A60C-4672-B750-514A8FDE8D0C}"/>
+              </a:ext>
+            </a:extLst>
+          </p:cNvPr>
+          <p:cNvPicPr>
+            <a:picLocks noGrp="1" noChangeAspect="1"/>
+          </p:cNvPicPr>
+          <p:nvPr>
+            <p:ph idx="1"/>
+          </p:nvPr>
+        </p:nvPicPr>
+        <p:blipFill>
+          <a:blip r:embed="rId3"/>
+          <a:stretch>
+            <a:fillRect/>
+          </a:stretch>
+        </p:blipFill>
+        <p:spPr>
+          <a:xfrm>
+            <a:off x="6052637" y="831966"/>
+            <a:ext cx="4757656" cy="2652537"/>
+          </a:xfrm>
+        </p:spPr>
+      </p:pic>
+    </p:spTree>
+    <p:extLst>
+      <p:ext uri="{BB962C8B-B14F-4D97-AF65-F5344CB8AC3E}">
+        <p14:creationId xmlns:p14="http://schemas.microsoft.com/office/powerpoint/2010/main" val="2195182873"/>
+      </p:ext>
+    </p:extLst>
+  </p:cSld>
+  <p:clrMapOvr>
+    <a:masterClrMapping/>
+  </p:clrMapOvr>
+</p:sld>
+</file>
+
+<file path=ppt/slides/slide17.xml><?xml version="1.0" encoding="utf-8"?>
+<p:sld xmlns:a="http://schemas.openxmlformats.org/drawingml/2006/main" xmlns:r="http://schemas.openxmlformats.org/officeDocument/2006/relationships" xmlns:p="http://schemas.openxmlformats.org/presentationml/2006/main">
+  <p:cSld>
+    <p:spTree>
+      <p:nvGrpSpPr>
+        <p:cNvPr id="1" name=""/>
+        <p:cNvGrpSpPr/>
+        <p:nvPr/>
+      </p:nvGrpSpPr>
+      <p:grpSpPr>
+        <a:xfrm>
+          <a:off x="0" y="0"/>
+          <a:ext cx="0" cy="0"/>
+          <a:chOff x="0" y="0"/>
+          <a:chExt cx="0" cy="0"/>
+        </a:xfrm>
+      </p:grpSpPr>
+      <p:sp>
+        <p:nvSpPr>
+          <p:cNvPr id="2" name="Title 1">
+            <a:extLst>
+              <a:ext uri="{FF2B5EF4-FFF2-40B4-BE49-F238E27FC236}">
+                <a16:creationId xmlns:a16="http://schemas.microsoft.com/office/drawing/2014/main" id="{127619F7-C7D3-4CB7-B259-F8CACEADBAC8}"/>
+              </a:ext>
+            </a:extLst>
+          </p:cNvPr>
+          <p:cNvSpPr>
+            <a:spLocks noGrp="1"/>
+          </p:cNvSpPr>
+          <p:nvPr>
+            <p:ph type="title"/>
+          </p:nvPr>
+        </p:nvSpPr>
+        <p:spPr/>
+        <p:txBody>
+          <a:bodyPr/>
+          <a:lstStyle/>
+          <a:p>
+            <a:r>
+              <a:rPr lang="en-US" dirty="0" err="1"/>
+              <a:t>Projekat</a:t>
+            </a:r>
+            <a:r>
+              <a:rPr lang="en-US" dirty="0"/>
+              <a:t> 3 – Grafana</a:t>
+            </a:r>
+          </a:p>
+        </p:txBody>
+      </p:sp>
+      <p:sp>
+        <p:nvSpPr>
+          <p:cNvPr id="3" name="Content Placeholder 2">
+            <a:extLst>
+              <a:ext uri="{FF2B5EF4-FFF2-40B4-BE49-F238E27FC236}">
+                <a16:creationId xmlns:a16="http://schemas.microsoft.com/office/drawing/2014/main" id="{367E609B-1342-48F3-9621-08998F7105CF}"/>
+              </a:ext>
+            </a:extLst>
+          </p:cNvPr>
+          <p:cNvSpPr>
+            <a:spLocks noGrp="1"/>
+          </p:cNvSpPr>
+          <p:nvPr>
+            <p:ph idx="1"/>
+          </p:nvPr>
+        </p:nvSpPr>
+        <p:spPr/>
+        <p:txBody>
+          <a:bodyPr/>
+          <a:lstStyle/>
+          <a:p>
+            <a:r>
+              <a:rPr lang="en-US" dirty="0" err="1"/>
+              <a:t>Slika</a:t>
+            </a:r>
+            <a:r>
+              <a:rPr lang="en-US" dirty="0"/>
+              <a:t> za </a:t>
+            </a:r>
+            <a:r>
+              <a:rPr lang="en-US" dirty="0" err="1"/>
+              <a:t>grafanu</a:t>
+            </a:r>
+            <a:endParaRPr lang="en-US" dirty="0"/>
+          </a:p>
+        </p:txBody>
+      </p:sp>
+    </p:spTree>
+    <p:extLst>
+      <p:ext uri="{BB962C8B-B14F-4D97-AF65-F5344CB8AC3E}">
+        <p14:creationId xmlns:p14="http://schemas.microsoft.com/office/powerpoint/2010/main" val="3589872978"/>
+      </p:ext>
+    </p:extLst>
+  </p:cSld>
+  <p:clrMapOvr>
+    <a:masterClrMapping/>
+  </p:clrMapOvr>
+</p:sld>
+</file>
+
+<file path=ppt/slides/slide18.xml><?xml version="1.0" encoding="utf-8"?>
+<p:sld xmlns:a="http://schemas.openxmlformats.org/drawingml/2006/main" xmlns:r="http://schemas.openxmlformats.org/officeDocument/2006/relationships" xmlns:p="http://schemas.openxmlformats.org/presentationml/2006/main">
+  <p:cSld>
+    <p:spTree>
+      <p:nvGrpSpPr>
+        <p:cNvPr id="1" name=""/>
+        <p:cNvGrpSpPr/>
+        <p:nvPr/>
+      </p:nvGrpSpPr>
+      <p:grpSpPr>
+        <a:xfrm>
+          <a:off x="0" y="0"/>
+          <a:ext cx="0" cy="0"/>
+          <a:chOff x="0" y="0"/>
+          <a:chExt cx="0" cy="0"/>
+        </a:xfrm>
+      </p:grpSpPr>
+      <p:sp>
+        <p:nvSpPr>
+          <p:cNvPr id="2" name="Title 1">
+            <a:extLst>
+              <a:ext uri="{FF2B5EF4-FFF2-40B4-BE49-F238E27FC236}">
                 <a16:creationId xmlns:a16="http://schemas.microsoft.com/office/drawing/2014/main" id="{675A9E94-692B-41EB-A471-FFD5C29B4D8B}"/>
               </a:ext>
             </a:extLst>

</xml_diff>

<commit_message>
Izmena prezentacije + PDF fajl
</commit_message>
<xml_diff>
--- a/Prezentacija projekata/Servisno-orijentisane arhitekture – Projekti.pptx
+++ b/Prezentacija projekata/Servisno-orijentisane arhitekture – Projekti.pptx
@@ -318,7 +318,7 @@
             <a:fld id="{B61BEF0D-F0BB-DE4B-95CE-6DB70DBA9567}" type="datetimeFigureOut">
               <a:rPr lang="en-US" smtClean="0"/>
               <a:pPr/>
-              <a:t>8/21/2022</a:t>
+              <a:t>8/23/2022</a:t>
             </a:fld>
             <a:endParaRPr lang="en-US" dirty="0"/>
           </a:p>
@@ -658,7 +658,7 @@
             <a:fld id="{B61BEF0D-F0BB-DE4B-95CE-6DB70DBA9567}" type="datetimeFigureOut">
               <a:rPr lang="en-US" smtClean="0"/>
               <a:pPr/>
-              <a:t>8/21/2022</a:t>
+              <a:t>8/23/2022</a:t>
             </a:fld>
             <a:endParaRPr lang="en-US" dirty="0"/>
           </a:p>
@@ -1061,7 +1061,7 @@
             <a:fld id="{B61BEF0D-F0BB-DE4B-95CE-6DB70DBA9567}" type="datetimeFigureOut">
               <a:rPr lang="en-US" smtClean="0"/>
               <a:pPr/>
-              <a:t>8/21/2022</a:t>
+              <a:t>8/23/2022</a:t>
             </a:fld>
             <a:endParaRPr lang="en-US" dirty="0"/>
           </a:p>
@@ -1399,7 +1399,7 @@
             <a:fld id="{B61BEF0D-F0BB-DE4B-95CE-6DB70DBA9567}" type="datetimeFigureOut">
               <a:rPr lang="en-US" smtClean="0"/>
               <a:pPr/>
-              <a:t>8/21/2022</a:t>
+              <a:t>8/23/2022</a:t>
             </a:fld>
             <a:endParaRPr lang="en-US" dirty="0"/>
           </a:p>
@@ -1721,7 +1721,7 @@
             <a:fld id="{B61BEF0D-F0BB-DE4B-95CE-6DB70DBA9567}" type="datetimeFigureOut">
               <a:rPr lang="en-US" smtClean="0"/>
               <a:pPr/>
-              <a:t>8/21/2022</a:t>
+              <a:t>8/23/2022</a:t>
             </a:fld>
             <a:endParaRPr lang="en-US" dirty="0"/>
           </a:p>
@@ -2119,7 +2119,7 @@
             <a:fld id="{B61BEF0D-F0BB-DE4B-95CE-6DB70DBA9567}" type="datetimeFigureOut">
               <a:rPr lang="en-US" smtClean="0"/>
               <a:pPr/>
-              <a:t>8/21/2022</a:t>
+              <a:t>8/23/2022</a:t>
             </a:fld>
             <a:endParaRPr lang="en-US" dirty="0"/>
           </a:p>
@@ -2378,7 +2378,7 @@
             <a:fld id="{B61BEF0D-F0BB-DE4B-95CE-6DB70DBA9567}" type="datetimeFigureOut">
               <a:rPr lang="en-US" smtClean="0"/>
               <a:pPr/>
-              <a:t>8/21/2022</a:t>
+              <a:t>8/23/2022</a:t>
             </a:fld>
             <a:endParaRPr lang="en-US" dirty="0"/>
           </a:p>
@@ -2642,7 +2642,7 @@
             <a:fld id="{B61BEF0D-F0BB-DE4B-95CE-6DB70DBA9567}" type="datetimeFigureOut">
               <a:rPr lang="en-US" smtClean="0"/>
               <a:pPr/>
-              <a:t>8/21/2022</a:t>
+              <a:t>8/23/2022</a:t>
             </a:fld>
             <a:endParaRPr lang="en-US" dirty="0"/>
           </a:p>
@@ -2906,7 +2906,7 @@
             <a:fld id="{B61BEF0D-F0BB-DE4B-95CE-6DB70DBA9567}" type="datetimeFigureOut">
               <a:rPr lang="en-US" smtClean="0"/>
               <a:pPr/>
-              <a:t>8/21/2022</a:t>
+              <a:t>8/23/2022</a:t>
             </a:fld>
             <a:endParaRPr lang="en-US" dirty="0"/>
           </a:p>
@@ -3237,7 +3237,7 @@
             <a:fld id="{B61BEF0D-F0BB-DE4B-95CE-6DB70DBA9567}" type="datetimeFigureOut">
               <a:rPr lang="en-US" smtClean="0"/>
               <a:pPr/>
-              <a:t>8/21/2022</a:t>
+              <a:t>8/23/2022</a:t>
             </a:fld>
             <a:endParaRPr lang="en-US" dirty="0"/>
           </a:p>
@@ -3562,7 +3562,7 @@
             <a:fld id="{B61BEF0D-F0BB-DE4B-95CE-6DB70DBA9567}" type="datetimeFigureOut">
               <a:rPr lang="en-US" smtClean="0"/>
               <a:pPr/>
-              <a:t>8/21/2022</a:t>
+              <a:t>8/23/2022</a:t>
             </a:fld>
             <a:endParaRPr lang="en-US" dirty="0"/>
           </a:p>
@@ -4021,7 +4021,7 @@
             <a:fld id="{B61BEF0D-F0BB-DE4B-95CE-6DB70DBA9567}" type="datetimeFigureOut">
               <a:rPr lang="en-US" smtClean="0"/>
               <a:pPr/>
-              <a:t>8/21/2022</a:t>
+              <a:t>8/23/2022</a:t>
             </a:fld>
             <a:endParaRPr lang="en-US" dirty="0"/>
           </a:p>
@@ -4228,7 +4228,7 @@
             <a:fld id="{B61BEF0D-F0BB-DE4B-95CE-6DB70DBA9567}" type="datetimeFigureOut">
               <a:rPr lang="en-US" smtClean="0"/>
               <a:pPr/>
-              <a:t>8/21/2022</a:t>
+              <a:t>8/23/2022</a:t>
             </a:fld>
             <a:endParaRPr lang="en-US" dirty="0"/>
           </a:p>
@@ -4407,7 +4407,7 @@
             <a:fld id="{B61BEF0D-F0BB-DE4B-95CE-6DB70DBA9567}" type="datetimeFigureOut">
               <a:rPr lang="en-US" smtClean="0"/>
               <a:pPr/>
-              <a:t>8/21/2022</a:t>
+              <a:t>8/23/2022</a:t>
             </a:fld>
             <a:endParaRPr lang="en-US" dirty="0"/>
           </a:p>
@@ -4742,7 +4742,7 @@
             <a:fld id="{B61BEF0D-F0BB-DE4B-95CE-6DB70DBA9567}" type="datetimeFigureOut">
               <a:rPr lang="en-US" smtClean="0"/>
               <a:pPr/>
-              <a:t>8/21/2022</a:t>
+              <a:t>8/23/2022</a:t>
             </a:fld>
             <a:endParaRPr lang="en-US" dirty="0"/>
           </a:p>
@@ -5089,7 +5089,7 @@
             <a:fld id="{B61BEF0D-F0BB-DE4B-95CE-6DB70DBA9567}" type="datetimeFigureOut">
               <a:rPr lang="en-US" smtClean="0"/>
               <a:pPr/>
-              <a:t>8/21/2022</a:t>
+              <a:t>8/23/2022</a:t>
             </a:fld>
             <a:endParaRPr lang="en-US" dirty="0"/>
           </a:p>
@@ -7208,7 +7208,7 @@
             <a:fld id="{B61BEF0D-F0BB-DE4B-95CE-6DB70DBA9567}" type="datetimeFigureOut">
               <a:rPr lang="en-US" smtClean="0"/>
               <a:pPr/>
-              <a:t>8/21/2022</a:t>
+              <a:t>8/23/2022</a:t>
             </a:fld>
             <a:endParaRPr lang="en-US" dirty="0"/>
           </a:p>
@@ -9428,10 +9428,10 @@
       </p:sp>
       <p:pic>
         <p:nvPicPr>
-          <p:cNvPr id="5" name="Content Placeholder 4">
+          <p:cNvPr id="7" name="Content Placeholder 6">
             <a:extLst>
               <a:ext uri="{FF2B5EF4-FFF2-40B4-BE49-F238E27FC236}">
-                <a16:creationId xmlns:a16="http://schemas.microsoft.com/office/drawing/2014/main" id="{80315FCF-FC51-44CE-81D8-44FF65EE1EDE}"/>
+                <a16:creationId xmlns:a16="http://schemas.microsoft.com/office/drawing/2014/main" id="{437606CF-1CEF-4554-85D4-6A775A62C31C}"/>
               </a:ext>
             </a:extLst>
           </p:cNvPr>
@@ -9450,8 +9450,8 @@
         </p:blipFill>
         <p:spPr>
           <a:xfrm>
-            <a:off x="1814797" y="1353124"/>
-            <a:ext cx="8562403" cy="4552607"/>
+            <a:off x="2086930" y="1248032"/>
+            <a:ext cx="8018139" cy="4663818"/>
           </a:xfrm>
         </p:spPr>
       </p:pic>
@@ -9740,8 +9740,8 @@
         </p:nvSpPr>
         <p:spPr>
           <a:xfrm>
-            <a:off x="840259" y="624110"/>
-            <a:ext cx="10664353" cy="1280890"/>
+            <a:off x="763823" y="163002"/>
+            <a:ext cx="10664353" cy="783776"/>
           </a:xfrm>
         </p:spPr>
         <p:txBody>
@@ -9775,12 +9775,14 @@
         </p:nvSpPr>
         <p:spPr>
           <a:xfrm>
-            <a:off x="840259" y="2133600"/>
-            <a:ext cx="10664353" cy="3777622"/>
+            <a:off x="931522" y="1320800"/>
+            <a:ext cx="10328955" cy="4677508"/>
           </a:xfrm>
         </p:spPr>
         <p:txBody>
-          <a:bodyPr/>
+          <a:bodyPr>
+            <a:normAutofit/>
+          </a:bodyPr>
           <a:lstStyle/>
           <a:p>
             <a:r>
@@ -9789,12 +9791,25 @@
             </a:r>
             <a:r>
               <a:rPr lang="en-US" dirty="0">
-                <a:hlinkClick r:id="rId2"/>
+                <a:solidFill>
+                  <a:srgbClr val="800000"/>
+                </a:solidFill>
+                <a:hlinkClick r:id="rId2">
+                  <a:extLst>
+                    <a:ext uri="{A12FA001-AC4F-418D-AE19-62706E023703}">
+                      <ahyp:hlinkClr xmlns:ahyp="http://schemas.microsoft.com/office/drawing/2018/hyperlinkcolor" val="tx"/>
+                    </a:ext>
+                  </a:extLst>
+                </a:hlinkClick>
               </a:rPr>
               <a:t>https://lyricsovh.docs.apiary.io/#</a:t>
             </a:r>
             <a:r>
-              <a:rPr lang="en-US" dirty="0"/>
+              <a:rPr lang="en-US" dirty="0">
+                <a:solidFill>
+                  <a:srgbClr val="800000"/>
+                </a:solidFill>
+              </a:rPr>
               <a:t> </a:t>
             </a:r>
           </a:p>
@@ -9813,11 +9828,24 @@
             </a:r>
             <a:r>
               <a:rPr lang="en-US" dirty="0">
-                <a:hlinkClick r:id="rId3"/>
+                <a:solidFill>
+                  <a:srgbClr val="800000"/>
+                </a:solidFill>
+                <a:hlinkClick r:id="rId3">
+                  <a:extLst>
+                    <a:ext uri="{A12FA001-AC4F-418D-AE19-62706E023703}">
+                      <ahyp:hlinkClr xmlns:ahyp="http://schemas.microsoft.com/office/drawing/2018/hyperlinkcolor" val="tx"/>
+                    </a:ext>
+                  </a:extLst>
+                </a:hlinkClick>
               </a:rPr>
               <a:t>https://www.kaggle.com/datasets/leonardopena/top50spotify2019</a:t>
             </a:r>
-            <a:endParaRPr lang="en-US" dirty="0"/>
+            <a:endParaRPr lang="en-US" dirty="0">
+              <a:solidFill>
+                <a:srgbClr val="800000"/>
+              </a:solidFill>
+            </a:endParaRPr>
           </a:p>
           <a:p>
             <a:r>
@@ -9834,11 +9862,61 @@
             </a:r>
             <a:r>
               <a:rPr lang="en-US" dirty="0">
-                <a:hlinkClick r:id="rId4"/>
+                <a:solidFill>
+                  <a:srgbClr val="800000"/>
+                </a:solidFill>
+                <a:hlinkClick r:id="rId4">
+                  <a:extLst>
+                    <a:ext uri="{A12FA001-AC4F-418D-AE19-62706E023703}">
+                      <ahyp:hlinkClr xmlns:ahyp="http://schemas.microsoft.com/office/drawing/2018/hyperlinkcolor" val="tx"/>
+                    </a:ext>
+                  </a:extLst>
+                </a:hlinkClick>
               </a:rPr>
               <a:t>https://www.kaggle.com/datasets/siddharthss/crop-recommendation-dataset?resource=download</a:t>
             </a:r>
-            <a:endParaRPr lang="en-US" dirty="0"/>
+            <a:endParaRPr lang="en-US" dirty="0">
+              <a:solidFill>
+                <a:srgbClr val="800000"/>
+              </a:solidFill>
+            </a:endParaRPr>
+          </a:p>
+          <a:p>
+            <a:r>
+              <a:rPr lang="en-US" dirty="0"/>
+              <a:t>Kuiper setup tutorial – </a:t>
+            </a:r>
+            <a:r>
+              <a:rPr lang="en-US" dirty="0" err="1"/>
+              <a:t>Projekat</a:t>
+            </a:r>
+            <a:r>
+              <a:rPr lang="en-US" dirty="0"/>
+              <a:t> 2 - </a:t>
+            </a:r>
+            <a:r>
+              <a:rPr lang="en-US" dirty="0">
+                <a:solidFill>
+                  <a:srgbClr val="800000"/>
+                </a:solidFill>
+                <a:hlinkClick r:id="rId5">
+                  <a:extLst>
+                    <a:ext uri="{A12FA001-AC4F-418D-AE19-62706E023703}">
+                      <ahyp:hlinkClr xmlns:ahyp="http://schemas.microsoft.com/office/drawing/2018/hyperlinkcolor" val="tx"/>
+                    </a:ext>
+                  </a:extLst>
+                </a:hlinkClick>
+              </a:rPr>
+              <a:t>https://github.com/sssteeefaaan/SOA-Projekat/tree/main/Projekat%20II</a:t>
+            </a:r>
+            <a:r>
+              <a:rPr lang="en-US" dirty="0">
+                <a:solidFill>
+                  <a:srgbClr val="800000"/>
+                </a:solidFill>
+              </a:rPr>
+              <a:t> </a:t>
+            </a:r>
           </a:p>
           <a:p>
             <a:r>
@@ -9855,12 +9933,66 @@
             </a:r>
             <a:r>
               <a:rPr lang="en-US" dirty="0">
-                <a:hlinkClick r:id="rId5"/>
+                <a:solidFill>
+                  <a:srgbClr val="800000"/>
+                </a:solidFill>
+                <a:hlinkClick r:id="rId6">
+                  <a:extLst>
+                    <a:ext uri="{A12FA001-AC4F-418D-AE19-62706E023703}">
+                      <ahyp:hlinkClr xmlns:ahyp="http://schemas.microsoft.com/office/drawing/2018/hyperlinkcolor" val="tx"/>
+                    </a:ext>
+                  </a:extLst>
+                </a:hlinkClick>
               </a:rPr>
               <a:t>https://www.kaggle.com/datasets/nelakurthisudheer/dataset-for-predicting-watering-the-plants</a:t>
             </a:r>
             <a:r>
-              <a:rPr lang="en-US" dirty="0"/>
+              <a:rPr lang="en-US" dirty="0">
+                <a:solidFill>
+                  <a:srgbClr val="800000"/>
+                </a:solidFill>
+              </a:rPr>
+              <a:t> </a:t>
+            </a:r>
+          </a:p>
+          <a:p>
+            <a:r>
+              <a:rPr lang="en-US" dirty="0" err="1"/>
+              <a:t>Edgex</a:t>
+            </a:r>
+            <a:r>
+              <a:rPr lang="en-US" dirty="0"/>
+              <a:t> setup tutorial – </a:t>
+            </a:r>
+            <a:r>
+              <a:rPr lang="en-US" dirty="0" err="1"/>
+              <a:t>Projekat</a:t>
+            </a:r>
+            <a:r>
+              <a:rPr lang="en-US" dirty="0"/>
+              <a:t> 3 - </a:t>
+            </a:r>
+            <a:r>
+              <a:rPr lang="en-US" dirty="0">
+                <a:solidFill>
+                  <a:srgbClr val="800000"/>
+                </a:solidFill>
+                <a:hlinkClick r:id="rId7">
+                  <a:extLst>
+                    <a:ext uri="{A12FA001-AC4F-418D-AE19-62706E023703}">
+                      <ahyp:hlinkClr xmlns:ahyp="http://schemas.microsoft.com/office/drawing/2018/hyperlinkcolor" val="tx"/>
+                    </a:ext>
+                  </a:extLst>
+                </a:hlinkClick>
+              </a:rPr>
+              <a:t>https://jonamiki.com/2020/08/26/edgex-foundry-hands-on-tutorial/</a:t>
+            </a:r>
+            <a:r>
+              <a:rPr lang="en-US" dirty="0">
+                <a:solidFill>
+                  <a:srgbClr val="800000"/>
+                </a:solidFill>
+              </a:rPr>
               <a:t> </a:t>
             </a:r>
           </a:p>

</xml_diff>